<commit_message>
edited gitignore to include logo pptx file
</commit_message>
<xml_diff>
--- a/logo.pptx
+++ b/logo.pptx
@@ -104,6 +104,11 @@
       </a:defRPr>
     </a:lvl9pPr>
   </p:defaultTextStyle>
+  <p:extLst>
+    <p:ext uri="{EFAFB233-063F-42B5-8137-9DF3F51BA10A}">
+      <p15:sldGuideLst xmlns:p15="http://schemas.microsoft.com/office/powerpoint/2012/main"/>
+    </p:ext>
+  </p:extLst>
 </p:presentation>
 </file>
 
@@ -256,7 +261,7 @@
           <a:p>
             <a:fld id="{4C3E2308-25F4-4ACA-8FFD-5580D7DA026A}" type="datetimeFigureOut">
               <a:rPr lang="en-CA" smtClean="0"/>
-              <a:t>2025-05-21</a:t>
+              <a:t>2025-05-26</a:t>
             </a:fld>
             <a:endParaRPr lang="en-CA"/>
           </a:p>
@@ -456,7 +461,7 @@
           <a:p>
             <a:fld id="{4C3E2308-25F4-4ACA-8FFD-5580D7DA026A}" type="datetimeFigureOut">
               <a:rPr lang="en-CA" smtClean="0"/>
-              <a:t>2025-05-21</a:t>
+              <a:t>2025-05-26</a:t>
             </a:fld>
             <a:endParaRPr lang="en-CA"/>
           </a:p>
@@ -666,7 +671,7 @@
           <a:p>
             <a:fld id="{4C3E2308-25F4-4ACA-8FFD-5580D7DA026A}" type="datetimeFigureOut">
               <a:rPr lang="en-CA" smtClean="0"/>
-              <a:t>2025-05-21</a:t>
+              <a:t>2025-05-26</a:t>
             </a:fld>
             <a:endParaRPr lang="en-CA"/>
           </a:p>
@@ -866,7 +871,7 @@
           <a:p>
             <a:fld id="{4C3E2308-25F4-4ACA-8FFD-5580D7DA026A}" type="datetimeFigureOut">
               <a:rPr lang="en-CA" smtClean="0"/>
-              <a:t>2025-05-21</a:t>
+              <a:t>2025-05-26</a:t>
             </a:fld>
             <a:endParaRPr lang="en-CA"/>
           </a:p>
@@ -1142,7 +1147,7 @@
           <a:p>
             <a:fld id="{4C3E2308-25F4-4ACA-8FFD-5580D7DA026A}" type="datetimeFigureOut">
               <a:rPr lang="en-CA" smtClean="0"/>
-              <a:t>2025-05-21</a:t>
+              <a:t>2025-05-26</a:t>
             </a:fld>
             <a:endParaRPr lang="en-CA"/>
           </a:p>
@@ -1410,7 +1415,7 @@
           <a:p>
             <a:fld id="{4C3E2308-25F4-4ACA-8FFD-5580D7DA026A}" type="datetimeFigureOut">
               <a:rPr lang="en-CA" smtClean="0"/>
-              <a:t>2025-05-21</a:t>
+              <a:t>2025-05-26</a:t>
             </a:fld>
             <a:endParaRPr lang="en-CA"/>
           </a:p>
@@ -1825,7 +1830,7 @@
           <a:p>
             <a:fld id="{4C3E2308-25F4-4ACA-8FFD-5580D7DA026A}" type="datetimeFigureOut">
               <a:rPr lang="en-CA" smtClean="0"/>
-              <a:t>2025-05-21</a:t>
+              <a:t>2025-05-26</a:t>
             </a:fld>
             <a:endParaRPr lang="en-CA"/>
           </a:p>
@@ -1967,7 +1972,7 @@
           <a:p>
             <a:fld id="{4C3E2308-25F4-4ACA-8FFD-5580D7DA026A}" type="datetimeFigureOut">
               <a:rPr lang="en-CA" smtClean="0"/>
-              <a:t>2025-05-21</a:t>
+              <a:t>2025-05-26</a:t>
             </a:fld>
             <a:endParaRPr lang="en-CA"/>
           </a:p>
@@ -2080,7 +2085,7 @@
           <a:p>
             <a:fld id="{4C3E2308-25F4-4ACA-8FFD-5580D7DA026A}" type="datetimeFigureOut">
               <a:rPr lang="en-CA" smtClean="0"/>
-              <a:t>2025-05-21</a:t>
+              <a:t>2025-05-26</a:t>
             </a:fld>
             <a:endParaRPr lang="en-CA"/>
           </a:p>
@@ -2393,7 +2398,7 @@
           <a:p>
             <a:fld id="{4C3E2308-25F4-4ACA-8FFD-5580D7DA026A}" type="datetimeFigureOut">
               <a:rPr lang="en-CA" smtClean="0"/>
-              <a:t>2025-05-21</a:t>
+              <a:t>2025-05-26</a:t>
             </a:fld>
             <a:endParaRPr lang="en-CA"/>
           </a:p>
@@ -2682,7 +2687,7 @@
           <a:p>
             <a:fld id="{4C3E2308-25F4-4ACA-8FFD-5580D7DA026A}" type="datetimeFigureOut">
               <a:rPr lang="en-CA" smtClean="0"/>
-              <a:t>2025-05-21</a:t>
+              <a:t>2025-05-26</a:t>
             </a:fld>
             <a:endParaRPr lang="en-CA"/>
           </a:p>
@@ -2925,7 +2930,7 @@
           <a:p>
             <a:fld id="{4C3E2308-25F4-4ACA-8FFD-5580D7DA026A}" type="datetimeFigureOut">
               <a:rPr lang="en-CA" smtClean="0"/>
-              <a:t>2025-05-21</a:t>
+              <a:t>2025-05-26</a:t>
             </a:fld>
             <a:endParaRPr lang="en-CA"/>
           </a:p>
@@ -3344,60 +3349,6 @@
       </p:grpSpPr>
       <p:sp>
         <p:nvSpPr>
-          <p:cNvPr id="4" name="Rectangle 3">
-            <a:extLst>
-              <a:ext uri="{FF2B5EF4-FFF2-40B4-BE49-F238E27FC236}">
-                <a16:creationId xmlns:a16="http://schemas.microsoft.com/office/drawing/2014/main" id="{F17F3C70-6E59-1A20-87FA-39BDF60FEE95}"/>
-              </a:ext>
-            </a:extLst>
-          </p:cNvPr>
-          <p:cNvSpPr/>
-          <p:nvPr/>
-        </p:nvSpPr>
-        <p:spPr>
-          <a:xfrm>
-            <a:off x="0" y="0"/>
-            <a:ext cx="12192000" cy="6858000"/>
-          </a:xfrm>
-          <a:prstGeom prst="rect">
-            <a:avLst/>
-          </a:prstGeom>
-          <a:solidFill>
-            <a:srgbClr val="C00000"/>
-          </a:solidFill>
-          <a:ln>
-            <a:solidFill>
-              <a:srgbClr val="C00000"/>
-            </a:solidFill>
-          </a:ln>
-        </p:spPr>
-        <p:style>
-          <a:lnRef idx="2">
-            <a:schemeClr val="accent1">
-              <a:shade val="15000"/>
-            </a:schemeClr>
-          </a:lnRef>
-          <a:fillRef idx="1">
-            <a:schemeClr val="accent1"/>
-          </a:fillRef>
-          <a:effectRef idx="0">
-            <a:schemeClr val="accent1"/>
-          </a:effectRef>
-          <a:fontRef idx="minor">
-            <a:schemeClr val="lt1"/>
-          </a:fontRef>
-        </p:style>
-        <p:txBody>
-          <a:bodyPr rtlCol="0" anchor="ctr"/>
-          <a:lstStyle/>
-          <a:p>
-            <a:pPr algn="ctr"/>
-            <a:endParaRPr lang="en-CA"/>
-          </a:p>
-        </p:txBody>
-      </p:sp>
-      <p:sp>
-        <p:nvSpPr>
           <p:cNvPr id="2" name="Title 1">
             <a:extLst>
               <a:ext uri="{FF2B5EF4-FFF2-40B4-BE49-F238E27FC236}">
@@ -3425,36 +3376,19 @@
           <a:lstStyle/>
           <a:p>
             <a:r>
-              <a:rPr lang="en-US" sz="13800" b="1" i="1" spc="-600" dirty="0">
+              <a:rPr lang="en-US" sz="13800" b="1" spc="-1200" dirty="0">
                 <a:solidFill>
-                  <a:schemeClr val="bg1"/>
+                  <a:srgbClr val="C00000"/>
                 </a:solidFill>
-                <a:latin typeface="Bodoni MT" panose="02070603080606020203" pitchFamily="18" charset="0"/>
+                <a:latin typeface="Comfortaa" pitchFamily="2" charset="0"/>
               </a:rPr>
-              <a:t>SHAWARMA</a:t>
-            </a:r>
-            <a:br>
-              <a:rPr lang="en-US" sz="13800" b="1" i="1" spc="-600" dirty="0">
-                <a:solidFill>
-                  <a:schemeClr val="bg1"/>
-                </a:solidFill>
-                <a:latin typeface="Bodoni MT" panose="02070603080606020203" pitchFamily="18" charset="0"/>
-              </a:rPr>
-            </a:br>
-            <a:r>
-              <a:rPr lang="en-US" sz="13800" b="1" i="1" spc="-600" dirty="0">
-                <a:solidFill>
-                  <a:schemeClr val="bg1"/>
-                </a:solidFill>
-                <a:latin typeface="Bodoni MT" panose="02070603080606020203" pitchFamily="18" charset="0"/>
-              </a:rPr>
-              <a:t>EMPIRE</a:t>
-            </a:r>
-            <a:endParaRPr lang="en-CA" sz="13800" b="1" i="1" spc="-600" dirty="0">
+              <a:t>Halal Momo</a:t>
+            </a:r>
+            <a:endParaRPr lang="en-CA" sz="13800" b="1" spc="-1200" dirty="0">
               <a:solidFill>
-                <a:schemeClr val="bg1"/>
+                <a:srgbClr val="C00000"/>
               </a:solidFill>
-              <a:latin typeface="Bodoni MT" panose="02070603080606020203" pitchFamily="18" charset="0"/>
+              <a:latin typeface="Comfortaa" pitchFamily="2" charset="0"/>
             </a:endParaRPr>
           </a:p>
         </p:txBody>
@@ -3788,6 +3722,23 @@
 </file>
 
 <file path=customXml/item1.xml><?xml version="1.0" encoding="utf-8"?>
+<p:properties xmlns:p="http://schemas.microsoft.com/office/2006/metadata/properties" xmlns:xsi="http://www.w3.org/2001/XMLSchema-instance" xmlns:pc="http://schemas.microsoft.com/office/infopath/2007/PartnerControls">
+  <documentManagement>
+    <_activity xmlns="8846b076-f675-43dd-86c7-eac1bce0087f" xsi:nil="true"/>
+  </documentManagement>
+</p:properties>
+</file>
+
+<file path=customXml/item2.xml><?xml version="1.0" encoding="utf-8"?>
+<?mso-contentType ?>
+<FormTemplates xmlns="http://schemas.microsoft.com/sharepoint/v3/contenttype/forms">
+  <Display>DocumentLibraryForm</Display>
+  <Edit>DocumentLibraryForm</Edit>
+  <New>DocumentLibraryForm</New>
+</FormTemplates>
+</file>
+
+<file path=customXml/item3.xml><?xml version="1.0" encoding="utf-8"?>
 <ct:contentTypeSchema xmlns:ct="http://schemas.microsoft.com/office/2006/metadata/contentType" xmlns:ma="http://schemas.microsoft.com/office/2006/metadata/properties/metaAttributes" ct:_="" ma:_="" ma:contentTypeName="Document" ma:contentTypeID="0x010100AE21CE8465823F4B816602D0E11C2D25" ma:contentTypeVersion="18" ma:contentTypeDescription="Create a new document." ma:contentTypeScope="" ma:versionID="49e9f68434654f519828f95c537b1aba">
   <xsd:schema xmlns:xsd="http://www.w3.org/2001/XMLSchema" xmlns:xs="http://www.w3.org/2001/XMLSchema" xmlns:p="http://schemas.microsoft.com/office/2006/metadata/properties" xmlns:ns3="8846b076-f675-43dd-86c7-eac1bce0087f" xmlns:ns4="580cd851-b44e-4f80-8a96-3f468e3575fb" targetNamespace="http://schemas.microsoft.com/office/2006/metadata/properties" ma:root="true" ma:fieldsID="475e23010c0fb8534bd923ed3176529a" ns3:_="" ns4:_="">
     <xsd:import namespace="8846b076-f675-43dd-86c7-eac1bce0087f"/>
@@ -4040,24 +3991,32 @@
 </ct:contentTypeSchema>
 </file>
 
-<file path=customXml/item2.xml><?xml version="1.0" encoding="utf-8"?>
-<?mso-contentType ?>
-<FormTemplates xmlns="http://schemas.microsoft.com/sharepoint/v3/contenttype/forms">
-  <Display>DocumentLibraryForm</Display>
-  <Edit>DocumentLibraryForm</Edit>
-  <New>DocumentLibraryForm</New>
-</FormTemplates>
+<file path=customXml/itemProps1.xml><?xml version="1.0" encoding="utf-8"?>
+<ds:datastoreItem xmlns:ds="http://schemas.openxmlformats.org/officeDocument/2006/customXml" ds:itemID="{8B37B050-28B6-421B-B24E-1E593D8CB15D}">
+  <ds:schemaRefs>
+    <ds:schemaRef ds:uri="http://purl.org/dc/terms/"/>
+    <ds:schemaRef ds:uri="http://www.w3.org/XML/1998/namespace"/>
+    <ds:schemaRef ds:uri="http://schemas.microsoft.com/office/2006/documentManagement/types"/>
+    <ds:schemaRef ds:uri="580cd851-b44e-4f80-8a96-3f468e3575fb"/>
+    <ds:schemaRef ds:uri="http://purl.org/dc/dcmitype/"/>
+    <ds:schemaRef ds:uri="http://schemas.microsoft.com/office/infopath/2007/PartnerControls"/>
+    <ds:schemaRef ds:uri="http://schemas.openxmlformats.org/package/2006/metadata/core-properties"/>
+    <ds:schemaRef ds:uri="8846b076-f675-43dd-86c7-eac1bce0087f"/>
+    <ds:schemaRef ds:uri="http://schemas.microsoft.com/office/2006/metadata/properties"/>
+    <ds:schemaRef ds:uri="http://purl.org/dc/elements/1.1/"/>
+  </ds:schemaRefs>
+</ds:datastoreItem>
 </file>
 
-<file path=customXml/item3.xml><?xml version="1.0" encoding="utf-8"?>
-<p:properties xmlns:p="http://schemas.microsoft.com/office/2006/metadata/properties" xmlns:xsi="http://www.w3.org/2001/XMLSchema-instance" xmlns:pc="http://schemas.microsoft.com/office/infopath/2007/PartnerControls">
-  <documentManagement>
-    <_activity xmlns="8846b076-f675-43dd-86c7-eac1bce0087f" xsi:nil="true"/>
-  </documentManagement>
-</p:properties>
+<file path=customXml/itemProps2.xml><?xml version="1.0" encoding="utf-8"?>
+<ds:datastoreItem xmlns:ds="http://schemas.openxmlformats.org/officeDocument/2006/customXml" ds:itemID="{30DA2DAF-39AF-443B-A9B1-03155CECBE85}">
+  <ds:schemaRefs>
+    <ds:schemaRef ds:uri="http://schemas.microsoft.com/sharepoint/v3/contenttype/forms"/>
+  </ds:schemaRefs>
+</ds:datastoreItem>
 </file>
 
-<file path=customXml/itemProps1.xml><?xml version="1.0" encoding="utf-8"?>
+<file path=customXml/itemProps3.xml><?xml version="1.0" encoding="utf-8"?>
 <ds:datastoreItem xmlns:ds="http://schemas.openxmlformats.org/officeDocument/2006/customXml" ds:itemID="{749A039F-7D5D-4502-A51B-6632C1827451}">
   <ds:schemaRefs>
     <ds:schemaRef ds:uri="http://schemas.microsoft.com/office/2006/metadata/contentType"/>
@@ -4074,29 +4033,4 @@
     <ds:schemaRef ds:uri="http://schemas.microsoft.com/internal/obd"/>
   </ds:schemaRefs>
 </ds:datastoreItem>
-</file>
-
-<file path=customXml/itemProps2.xml><?xml version="1.0" encoding="utf-8"?>
-<ds:datastoreItem xmlns:ds="http://schemas.openxmlformats.org/officeDocument/2006/customXml" ds:itemID="{30DA2DAF-39AF-443B-A9B1-03155CECBE85}">
-  <ds:schemaRefs>
-    <ds:schemaRef ds:uri="http://schemas.microsoft.com/sharepoint/v3/contenttype/forms"/>
-  </ds:schemaRefs>
-</ds:datastoreItem>
-</file>
-
-<file path=customXml/itemProps3.xml><?xml version="1.0" encoding="utf-8"?>
-<ds:datastoreItem xmlns:ds="http://schemas.openxmlformats.org/officeDocument/2006/customXml" ds:itemID="{8B37B050-28B6-421B-B24E-1E593D8CB15D}">
-  <ds:schemaRefs>
-    <ds:schemaRef ds:uri="http://purl.org/dc/terms/"/>
-    <ds:schemaRef ds:uri="http://www.w3.org/XML/1998/namespace"/>
-    <ds:schemaRef ds:uri="http://schemas.microsoft.com/office/2006/documentManagement/types"/>
-    <ds:schemaRef ds:uri="580cd851-b44e-4f80-8a96-3f468e3575fb"/>
-    <ds:schemaRef ds:uri="http://purl.org/dc/dcmitype/"/>
-    <ds:schemaRef ds:uri="http://schemas.microsoft.com/office/infopath/2007/PartnerControls"/>
-    <ds:schemaRef ds:uri="http://schemas.openxmlformats.org/package/2006/metadata/core-properties"/>
-    <ds:schemaRef ds:uri="8846b076-f675-43dd-86c7-eac1bce0087f"/>
-    <ds:schemaRef ds:uri="http://schemas.microsoft.com/office/2006/metadata/properties"/>
-    <ds:schemaRef ds:uri="http://purl.org/dc/elements/1.1/"/>
-  </ds:schemaRefs>
-</ds:datastoreItem>
 </file>
</xml_diff>